<commit_message>
Updated to version 2.0
</commit_message>
<xml_diff>
--- a/Scout24ITPrinciples.pptx
+++ b/Scout24ITPrinciples.pptx
@@ -618,7 +618,6 @@
               <a:rPr lang="en-US" b="1" dirty="0" smtClean="0"/>
               <a:t>Disclaimers</a:t>
             </a:r>
-            <a:endParaRPr lang="en-US" b="1" dirty="0" smtClean="0"/>
           </a:p>
           <a:p>
             <a:pPr marL="171450" indent="-171450">
@@ -668,6 +667,29 @@
               <a:rPr lang="en-US" baseline="0" dirty="0" smtClean="0"/>
               <a:t>” is relevant for all principles. Principles not Dogmas.</a:t>
             </a:r>
+          </a:p>
+          <a:p>
+            <a:pPr marL="171450" marR="0" indent="-171450" algn="l" defTabSz="914242" rtl="0" eaLnBrk="1" fontAlgn="auto" latinLnBrk="0" hangingPunct="1">
+              <a:lnSpc>
+                <a:spcPct val="100000"/>
+              </a:lnSpc>
+              <a:spcBef>
+                <a:spcPts val="0"/>
+              </a:spcBef>
+              <a:spcAft>
+                <a:spcPts val="0"/>
+              </a:spcAft>
+              <a:buClrTx/>
+              <a:buSzTx/>
+              <a:buFont typeface="Arial" charset="0"/>
+              <a:buChar char="•"/>
+              <a:tabLst/>
+              <a:defRPr/>
+            </a:pPr>
+            <a:r>
+              <a:rPr lang="en-US" baseline="0" dirty="0" smtClean="0"/>
+              <a:t>Obvious things that are already part of our core beliefs are note mentioned. For example Lean, Agile and Continuous Integration.</a:t>
+            </a:r>
             <a:endParaRPr lang="en-US" dirty="0" smtClean="0"/>
           </a:p>
           <a:p>
@@ -686,13 +708,22 @@
               </a:spcBef>
               <a:buNone/>
             </a:pPr>
+            <a:endParaRPr lang="en-US" dirty="0" smtClean="0"/>
+          </a:p>
+          <a:p>
+            <a:pPr>
+              <a:spcBef>
+                <a:spcPts val="0"/>
+              </a:spcBef>
+              <a:buNone/>
+            </a:pPr>
             <a:r>
               <a:rPr lang="en-US" b="1" dirty="0" smtClean="0"/>
-              <a:t>Reduce</a:t>
+              <a:t>Mobile</a:t>
             </a:r>
             <a:r>
               <a:rPr lang="en-US" b="1" baseline="0" dirty="0" smtClean="0"/>
-              <a:t> Time to Market</a:t>
+              <a:t> First</a:t>
             </a:r>
             <a:endParaRPr lang="en-US" b="1" dirty="0" smtClean="0"/>
           </a:p>
@@ -706,238 +737,15 @@
             </a:pPr>
             <a:r>
               <a:rPr lang="en-US" dirty="0" smtClean="0"/>
-              <a:t>Reduce Time from</a:t>
+              <a:t>Sync</a:t>
             </a:r>
             <a:r>
               <a:rPr lang="en-US" baseline="0" dirty="0" smtClean="0"/>
-              <a:t> </a:t>
-            </a:r>
-            <a:r>
-              <a:rPr lang="en-US" dirty="0" smtClean="0"/>
-              <a:t>Idea</a:t>
+              <a:t> state between </a:t>
             </a:r>
             <a:r>
               <a:rPr lang="en-US" baseline="0" dirty="0" smtClean="0"/>
-              <a:t> to</a:t>
-            </a:r>
-            <a:r>
-              <a:rPr lang="en-US" dirty="0" smtClean="0"/>
-              <a:t> Impact</a:t>
-            </a:r>
-          </a:p>
-          <a:p>
-            <a:pPr>
-              <a:spcBef>
-                <a:spcPts val="0"/>
-              </a:spcBef>
-              <a:buNone/>
-            </a:pPr>
-            <a:endParaRPr lang="en-US" dirty="0" smtClean="0"/>
-          </a:p>
-          <a:p>
-            <a:pPr>
-              <a:spcBef>
-                <a:spcPts val="0"/>
-              </a:spcBef>
-              <a:buNone/>
-            </a:pPr>
-            <a:r>
-              <a:rPr lang="en-US" b="1" dirty="0" smtClean="0"/>
-              <a:t>Optimize</a:t>
-            </a:r>
-            <a:r>
-              <a:rPr lang="en-US" b="1" baseline="0" dirty="0" smtClean="0"/>
-              <a:t> for Growth</a:t>
-            </a:r>
-          </a:p>
-          <a:p>
-            <a:pPr>
-              <a:spcBef>
-                <a:spcPts val="0"/>
-              </a:spcBef>
-              <a:buNone/>
-            </a:pPr>
-            <a:r>
-              <a:rPr lang="en-US" b="0" baseline="0" dirty="0" smtClean="0"/>
-              <a:t>### Tagline confuses and puts to many constraints in place ###</a:t>
-            </a:r>
-          </a:p>
-          <a:p>
-            <a:pPr>
-              <a:spcBef>
-                <a:spcPts val="0"/>
-              </a:spcBef>
-              <a:buNone/>
-            </a:pPr>
-            <a:r>
-              <a:rPr lang="en-US" b="0" baseline="0" dirty="0" smtClean="0"/>
-              <a:t>### </a:t>
-            </a:r>
-            <a:r>
-              <a:rPr lang="en-US" b="0" baseline="0" dirty="0" smtClean="0"/>
-              <a:t>Concrete scenarios needed ###</a:t>
-            </a:r>
-          </a:p>
-          <a:p>
-            <a:pPr marL="171450" indent="-171450">
-              <a:spcBef>
-                <a:spcPts val="0"/>
-              </a:spcBef>
-              <a:buFont typeface="Arial" panose="020B0604020202020204" pitchFamily="34" charset="0"/>
-              <a:buChar char="•"/>
-            </a:pPr>
-            <a:r>
-              <a:rPr lang="en-US" b="0" baseline="0" dirty="0" smtClean="0"/>
-              <a:t>No </a:t>
-            </a:r>
-            <a:r>
-              <a:rPr lang="en-US" b="0" baseline="0" dirty="0" smtClean="0"/>
-              <a:t>handbrakes</a:t>
-            </a:r>
-          </a:p>
-          <a:p>
-            <a:pPr marL="171450" indent="-171450">
-              <a:spcBef>
-                <a:spcPts val="0"/>
-              </a:spcBef>
-              <a:buFont typeface="Arial" panose="020B0604020202020204" pitchFamily="34" charset="0"/>
-              <a:buChar char="•"/>
-            </a:pPr>
-            <a:endParaRPr lang="en-US" b="1" dirty="0" smtClean="0"/>
-          </a:p>
-          <a:p>
-            <a:pPr>
-              <a:spcBef>
-                <a:spcPts val="0"/>
-              </a:spcBef>
-              <a:buNone/>
-            </a:pPr>
-            <a:r>
-              <a:rPr lang="en-US" b="1" dirty="0" smtClean="0"/>
-              <a:t>Organized</a:t>
-            </a:r>
-            <a:r>
-              <a:rPr lang="en-US" b="1" baseline="0" dirty="0" smtClean="0"/>
-              <a:t> around Business Capabilities</a:t>
-            </a:r>
-          </a:p>
-          <a:p>
-            <a:pPr marL="171450" indent="-171450">
-              <a:spcBef>
-                <a:spcPts val="0"/>
-              </a:spcBef>
-              <a:buFont typeface="Arial" charset="0"/>
-              <a:buChar char="•"/>
-            </a:pPr>
-            <a:r>
-              <a:rPr lang="en-US" baseline="0" dirty="0" smtClean="0"/>
-              <a:t>Includes internal products like shared infrastructure.</a:t>
-            </a:r>
-          </a:p>
-          <a:p>
-            <a:pPr marL="171450" indent="-171450">
-              <a:spcBef>
-                <a:spcPts val="0"/>
-              </a:spcBef>
-              <a:buFont typeface="Arial" charset="0"/>
-              <a:buChar char="•"/>
-            </a:pPr>
-            <a:r>
-              <a:rPr lang="en-US" baseline="0" dirty="0" smtClean="0"/>
-              <a:t>Different approaches like having a dedicated platform team or via a infrastructure guild are not in conflict with this principle.</a:t>
-            </a:r>
-          </a:p>
-          <a:p>
-            <a:pPr marL="0" indent="0">
-              <a:spcBef>
-                <a:spcPts val="0"/>
-              </a:spcBef>
-              <a:buFont typeface="Arial" charset="0"/>
-              <a:buNone/>
-            </a:pPr>
-            <a:endParaRPr lang="en-US" baseline="0" dirty="0" smtClean="0"/>
-          </a:p>
-          <a:p>
-            <a:pPr marL="0" indent="0">
-              <a:spcBef>
-                <a:spcPts val="0"/>
-              </a:spcBef>
-              <a:buFont typeface="Arial" charset="0"/>
-              <a:buNone/>
-            </a:pPr>
-            <a:r>
-              <a:rPr lang="en-US" b="1" baseline="0" dirty="0" smtClean="0"/>
-              <a:t>Containment and Boundaries</a:t>
-            </a:r>
-          </a:p>
-          <a:p>
-            <a:pPr marL="0" indent="0">
-              <a:spcBef>
-                <a:spcPts val="0"/>
-              </a:spcBef>
-              <a:buFont typeface="Arial" charset="0"/>
-              <a:buNone/>
-            </a:pPr>
-            <a:r>
-              <a:rPr lang="en-US" b="1" baseline="0" dirty="0" smtClean="0"/>
-              <a:t>### Clear boundaries and interfaces – Draw clear boundaries along business capabilities to limit blast radius and vendor lock-in ###</a:t>
-            </a:r>
-            <a:endParaRPr lang="en-US" b="1" baseline="0" dirty="0"/>
-          </a:p>
-          <a:p>
-            <a:pPr marL="171450" indent="-171450">
-              <a:spcBef>
-                <a:spcPts val="0"/>
-              </a:spcBef>
-              <a:buFont typeface="Arial" charset="0"/>
-              <a:buChar char="•"/>
-            </a:pPr>
-            <a:r>
-              <a:rPr lang="en-US" baseline="0" dirty="0" smtClean="0"/>
-              <a:t>The boundary is an AWS account. </a:t>
-            </a:r>
-          </a:p>
-          <a:p>
-            <a:pPr marL="171450" indent="-171450">
-              <a:spcBef>
-                <a:spcPts val="0"/>
-              </a:spcBef>
-              <a:buFont typeface="Arial" charset="0"/>
-              <a:buChar char="•"/>
-            </a:pPr>
-            <a:r>
-              <a:rPr lang="en-US" baseline="0" dirty="0" smtClean="0"/>
-              <a:t>With each new product or big feature add, actively think about adding this to an existing account or if this is a good reason to create it in a new and separate account.</a:t>
-            </a:r>
-          </a:p>
-          <a:p>
-            <a:pPr marL="171450" indent="-171450">
-              <a:spcBef>
-                <a:spcPts val="0"/>
-              </a:spcBef>
-              <a:buFont typeface="Arial" charset="0"/>
-              <a:buChar char="•"/>
-            </a:pPr>
-            <a:r>
-              <a:rPr lang="en-US" baseline="0" dirty="0" smtClean="0"/>
-              <a:t>This </a:t>
-            </a:r>
-            <a:r>
-              <a:rPr lang="en-US" baseline="0" dirty="0" smtClean="0"/>
-              <a:t>does not mean, one account per service. One account per tribe is a good starting point.</a:t>
-            </a:r>
-          </a:p>
-          <a:p>
-            <a:pPr marL="171450" indent="-171450">
-              <a:spcBef>
-                <a:spcPts val="0"/>
-              </a:spcBef>
-              <a:buFont typeface="Arial" charset="0"/>
-              <a:buChar char="•"/>
-            </a:pPr>
-            <a:r>
-              <a:rPr lang="en-US" baseline="0" dirty="0" smtClean="0"/>
-              <a:t>Between Accounts, favor asynchronous communication</a:t>
+              <a:t>platforms</a:t>
             </a:r>
           </a:p>
           <a:p>
@@ -960,7 +768,7 @@
             </a:pPr>
             <a:r>
               <a:rPr lang="en-US" b="1" baseline="0" dirty="0" smtClean="0"/>
-              <a:t>Loosely coupled</a:t>
+              <a:t>Tech Culture</a:t>
             </a:r>
           </a:p>
           <a:p>
@@ -973,7 +781,23 @@
             </a:pPr>
             <a:r>
               <a:rPr lang="en-US" baseline="0" dirty="0" smtClean="0"/>
-              <a:t>“Shared nothing” was too dogmatic and too much explanation needed. Loose coupling is what we really want.</a:t>
+              <a:t>For a better understanding of those terms, see Dan Pink: https://</a:t>
+            </a:r>
+            <a:r>
+              <a:rPr lang="en-US" baseline="0" dirty="0" err="1" smtClean="0"/>
+              <a:t>www.youtube.com</a:t>
+            </a:r>
+            <a:r>
+              <a:rPr lang="en-US" baseline="0" dirty="0" smtClean="0"/>
+              <a:t>/</a:t>
+            </a:r>
+            <a:r>
+              <a:rPr lang="en-US" baseline="0" dirty="0" err="1" smtClean="0"/>
+              <a:t>watch?v</a:t>
+            </a:r>
+            <a:r>
+              <a:rPr lang="en-US" baseline="0" dirty="0" smtClean="0"/>
+              <a:t>=u6XAPnuFjJc</a:t>
             </a:r>
           </a:p>
           <a:p>
@@ -985,8 +809,20 @@
               <a:buChar char="•"/>
             </a:pPr>
             <a:r>
+              <a:rPr lang="en-US" baseline="0" dirty="0" err="1" smtClean="0"/>
+              <a:t>Zalando</a:t>
+            </a:r>
+            <a:r>
               <a:rPr lang="en-US" baseline="0" dirty="0" smtClean="0"/>
-              <a:t>Avoid sharing includes shared infrastructure. Do share big things.</a:t>
+              <a:t> and their Radical Agility: https://</a:t>
+            </a:r>
+            <a:r>
+              <a:rPr lang="en-US" baseline="0" dirty="0" err="1" smtClean="0"/>
+              <a:t>tech.zalando.de</a:t>
+            </a:r>
+            <a:r>
+              <a:rPr lang="en-US" baseline="0" dirty="0" smtClean="0"/>
+              <a:t>/working-at-z/</a:t>
             </a:r>
           </a:p>
           <a:p>
@@ -997,15 +833,19 @@
               <a:buFont typeface="Arial" charset="0"/>
               <a:buChar char="•"/>
             </a:pPr>
-            <a:r>
-              <a:rPr lang="en-US" baseline="0" dirty="0" smtClean="0"/>
-              <a:t>Share code only through OSS or internal OSS. There are maintainer/committer and active user who issue pull requests. See </a:t>
-            </a:r>
-            <a:r>
-              <a:rPr lang="en-US" i="0" baseline="0" dirty="0" smtClean="0"/>
-              <a:t>https://wiki.rz.is/x/JgD9Aw</a:t>
-            </a:r>
             <a:endParaRPr lang="en-US" baseline="0" dirty="0" smtClean="0"/>
+          </a:p>
+          <a:p>
+            <a:pPr>
+              <a:spcBef>
+                <a:spcPts val="0"/>
+              </a:spcBef>
+              <a:buNone/>
+            </a:pPr>
+            <a:r>
+              <a:rPr lang="en-US" b="1" dirty="0" smtClean="0"/>
+              <a:t>Cost efficiency</a:t>
+            </a:r>
           </a:p>
           <a:p>
             <a:pPr marL="171450" indent="-171450">
@@ -1016,17 +856,586 @@
               <a:buChar char="•"/>
             </a:pPr>
             <a:r>
+              <a:rPr lang="en-US" dirty="0" smtClean="0"/>
+              <a:t>Includes</a:t>
+            </a:r>
+            <a:r>
+              <a:rPr lang="en-US" baseline="0" dirty="0" smtClean="0"/>
+              <a:t> infrastructure</a:t>
+            </a:r>
+          </a:p>
+          <a:p>
+            <a:pPr marL="171450" indent="-171450">
+              <a:spcBef>
+                <a:spcPts val="0"/>
+              </a:spcBef>
+              <a:buFont typeface="Arial" charset="0"/>
+              <a:buChar char="•"/>
+            </a:pPr>
+            <a:endParaRPr lang="en-US" baseline="0" dirty="0" smtClean="0"/>
+          </a:p>
+          <a:p>
+            <a:pPr marL="0" indent="0">
+              <a:spcBef>
+                <a:spcPts val="0"/>
+              </a:spcBef>
+              <a:buFont typeface="Arial" charset="0"/>
+              <a:buNone/>
+            </a:pPr>
+            <a:r>
+              <a:rPr lang="en-US" b="1" dirty="0" smtClean="0"/>
+              <a:t>One Scout IT</a:t>
+            </a:r>
+          </a:p>
+          <a:p>
+            <a:pPr marL="171450" indent="-171450">
+              <a:spcBef>
+                <a:spcPts val="0"/>
+              </a:spcBef>
+              <a:buFont typeface="Arial" charset="0"/>
+              <a:buChar char="•"/>
+            </a:pPr>
+            <a:r>
+              <a:rPr lang="en-US" dirty="0" err="1" smtClean="0"/>
+              <a:t>Applience</a:t>
+            </a:r>
+            <a:r>
+              <a:rPr lang="en-US" baseline="0" dirty="0" smtClean="0"/>
+              <a:t> model included as concept for a platform service</a:t>
+            </a:r>
+            <a:endParaRPr lang="en-US" dirty="0" smtClean="0"/>
+          </a:p>
+          <a:p>
+            <a:pPr>
+              <a:spcBef>
+                <a:spcPts val="0"/>
+              </a:spcBef>
+              <a:buNone/>
+            </a:pPr>
+            <a:endParaRPr lang="en-US" dirty="0" smtClean="0"/>
+          </a:p>
+          <a:p>
+            <a:pPr>
+              <a:spcBef>
+                <a:spcPts val="0"/>
+              </a:spcBef>
+              <a:buNone/>
+            </a:pPr>
+            <a:r>
+              <a:rPr lang="en-US" b="1" dirty="0" smtClean="0"/>
+              <a:t>Organized</a:t>
+            </a:r>
+            <a:r>
+              <a:rPr lang="en-US" b="1" baseline="0" dirty="0" smtClean="0"/>
+              <a:t> around Business Capabilities</a:t>
+            </a:r>
+          </a:p>
+          <a:p>
+            <a:pPr marL="171450" indent="-171450">
+              <a:spcBef>
+                <a:spcPts val="0"/>
+              </a:spcBef>
+              <a:buFont typeface="Arial" charset="0"/>
+              <a:buChar char="•"/>
+            </a:pPr>
+            <a:r>
+              <a:rPr lang="en-US" baseline="0" dirty="0" smtClean="0"/>
+              <a:t>Includes internal products in the business or infrastructure platform.</a:t>
+            </a:r>
+          </a:p>
+          <a:p>
+            <a:pPr marL="171450" indent="-171450">
+              <a:spcBef>
+                <a:spcPts val="0"/>
+              </a:spcBef>
+              <a:buFont typeface="Arial" charset="0"/>
+              <a:buChar char="•"/>
+            </a:pPr>
+            <a:r>
+              <a:rPr lang="en-US" baseline="0" dirty="0" smtClean="0"/>
+              <a:t>Business capabilities typically map to bounded contexts known from DDD.</a:t>
+            </a:r>
+          </a:p>
+          <a:p>
+            <a:pPr marL="171450" indent="-171450">
+              <a:spcBef>
+                <a:spcPts val="0"/>
+              </a:spcBef>
+              <a:buFont typeface="Arial" charset="0"/>
+              <a:buChar char="•"/>
+            </a:pPr>
+            <a:r>
+              <a:rPr lang="en-US" baseline="0" dirty="0" smtClean="0"/>
+              <a:t>Inverse Conway Maneuver: Loosely coupled teams responsible for business capabilities lead to corresponding services aligned with those business capabilities</a:t>
+            </a:r>
+            <a:r>
+              <a:rPr lang="en-US" baseline="0" dirty="0" smtClean="0"/>
+              <a:t>.</a:t>
+            </a:r>
+          </a:p>
+          <a:p>
+            <a:pPr marL="171450" indent="-171450">
+              <a:spcBef>
+                <a:spcPts val="0"/>
+              </a:spcBef>
+              <a:buFont typeface="Arial" charset="0"/>
+              <a:buChar char="•"/>
+            </a:pPr>
+            <a:r>
+              <a:rPr lang="en-US" baseline="0" dirty="0" smtClean="0"/>
+              <a:t>Expert exchange is not in violation: For example platform experts can help co-creating a service in a product team.</a:t>
+            </a:r>
+            <a:endParaRPr lang="en-US" baseline="0" dirty="0" smtClean="0"/>
+          </a:p>
+          <a:p>
+            <a:pPr marL="171450" indent="-171450">
+              <a:spcBef>
+                <a:spcPts val="0"/>
+              </a:spcBef>
+              <a:buFont typeface="Arial" charset="0"/>
+              <a:buChar char="•"/>
+            </a:pPr>
+            <a:endParaRPr lang="en-US" baseline="0" dirty="0" smtClean="0"/>
+          </a:p>
+          <a:p>
+            <a:pPr marL="0" indent="0">
+              <a:spcBef>
+                <a:spcPts val="0"/>
+              </a:spcBef>
+              <a:buFont typeface="Arial" charset="0"/>
+              <a:buNone/>
+            </a:pPr>
+            <a:r>
+              <a:rPr lang="en-US" b="1" baseline="0" dirty="0" smtClean="0"/>
+              <a:t>Eliminate Accidental Complexity</a:t>
+            </a:r>
+          </a:p>
+          <a:p>
+            <a:pPr marL="171450" indent="-171450">
+              <a:spcBef>
+                <a:spcPts val="0"/>
+              </a:spcBef>
+              <a:buFont typeface="Arial" charset="0"/>
+              <a:buChar char="•"/>
+            </a:pPr>
+            <a:r>
+              <a:rPr lang="en-US" baseline="0" dirty="0" smtClean="0"/>
+              <a:t>Essential complexity is the core of the problem we have to solve. It is based on true functional and cross-functional requirements.</a:t>
+            </a:r>
+          </a:p>
+          <a:p>
+            <a:pPr marL="171450" indent="-171450">
+              <a:spcBef>
+                <a:spcPts val="0"/>
+              </a:spcBef>
+              <a:buFont typeface="Arial" charset="0"/>
+              <a:buChar char="•"/>
+            </a:pPr>
+            <a:r>
+              <a:rPr lang="en-US" baseline="0" dirty="0" smtClean="0"/>
+              <a:t>Accidental complexity is all the other stuff that doesn’t directly relate to the solution derived from the requirements.</a:t>
+            </a:r>
+          </a:p>
+          <a:p>
+            <a:pPr marL="171450" indent="-171450">
+              <a:spcBef>
+                <a:spcPts val="0"/>
+              </a:spcBef>
+              <a:buFont typeface="Arial" charset="0"/>
+              <a:buChar char="•"/>
+            </a:pPr>
+            <a:r>
+              <a:rPr lang="en-US" baseline="0" dirty="0" smtClean="0"/>
+              <a:t>Boy scout rule</a:t>
+            </a:r>
+          </a:p>
+          <a:p>
+            <a:pPr marL="171450" indent="-171450">
+              <a:spcBef>
+                <a:spcPts val="0"/>
+              </a:spcBef>
+              <a:buFont typeface="Arial" charset="0"/>
+              <a:buChar char="•"/>
+            </a:pPr>
+            <a:endParaRPr lang="en-US" baseline="0" dirty="0" smtClean="0"/>
+          </a:p>
+          <a:p>
+            <a:pPr marL="0" indent="0">
+              <a:spcBef>
+                <a:spcPts val="0"/>
+              </a:spcBef>
+              <a:buFont typeface="Arial" charset="0"/>
+              <a:buNone/>
+            </a:pPr>
+            <a:r>
+              <a:rPr lang="en-US" b="1" baseline="0" dirty="0" smtClean="0"/>
+              <a:t>Loosely coupled</a:t>
+            </a:r>
+          </a:p>
+          <a:p>
+            <a:pPr marL="171450" indent="-171450">
+              <a:spcBef>
+                <a:spcPts val="0"/>
+              </a:spcBef>
+              <a:buFont typeface="Arial" charset="0"/>
+              <a:buChar char="•"/>
+            </a:pPr>
+            <a:r>
+              <a:rPr lang="en-US" baseline="0" dirty="0" smtClean="0"/>
+              <a:t>Avoid sharing includes shared infrastructure.</a:t>
+            </a:r>
+          </a:p>
+          <a:p>
+            <a:pPr marL="171450" indent="-171450">
+              <a:spcBef>
+                <a:spcPts val="0"/>
+              </a:spcBef>
+              <a:buFont typeface="Arial" charset="0"/>
+              <a:buChar char="•"/>
+            </a:pPr>
+            <a:r>
+              <a:rPr lang="en-US" baseline="0" dirty="0" smtClean="0"/>
+              <a:t>Using a multi-tenant capable platform API is not sharing. </a:t>
+            </a:r>
+          </a:p>
+          <a:p>
+            <a:pPr marL="171450" indent="-171450">
+              <a:spcBef>
+                <a:spcPts val="0"/>
+              </a:spcBef>
+              <a:buFont typeface="Arial" charset="0"/>
+              <a:buChar char="•"/>
+            </a:pPr>
+            <a:r>
               <a:rPr lang="en-US" baseline="0" dirty="0" smtClean="0"/>
               <a:t>No premature generalization. First have the problem and solve it. With the next incarnation of the same problem, start generalizing it.</a:t>
             </a:r>
           </a:p>
           <a:p>
+            <a:pPr marL="171450" indent="-171450">
+              <a:spcBef>
+                <a:spcPts val="0"/>
+              </a:spcBef>
+              <a:buFont typeface="Arial" charset="0"/>
+              <a:buChar char="•"/>
+            </a:pPr>
+            <a:endParaRPr lang="en-US" baseline="0" dirty="0" smtClean="0"/>
+          </a:p>
+          <a:p>
             <a:pPr marL="0" indent="0">
               <a:spcBef>
                 <a:spcPts val="0"/>
               </a:spcBef>
               <a:buFont typeface="Arial" charset="0"/>
               <a:buNone/>
+            </a:pPr>
+            <a:r>
+              <a:rPr lang="en-US" b="1" baseline="0" dirty="0" smtClean="0"/>
+              <a:t>AWS First</a:t>
+            </a:r>
+          </a:p>
+          <a:p>
+            <a:pPr marL="171450" indent="-171450">
+              <a:spcBef>
+                <a:spcPts val="0"/>
+              </a:spcBef>
+              <a:buFont typeface="Arial" charset="0"/>
+              <a:buChar char="•"/>
+            </a:pPr>
+            <a:r>
+              <a:rPr lang="en-US" baseline="0" dirty="0" smtClean="0"/>
+              <a:t>Favor over as in the agile manifesto: There are use cases for things on the right, we start with and prefer things on the left.</a:t>
+            </a:r>
+          </a:p>
+          <a:p>
+            <a:pPr marL="171450" indent="-171450">
+              <a:spcBef>
+                <a:spcPts val="0"/>
+              </a:spcBef>
+              <a:buFont typeface="Arial" charset="0"/>
+              <a:buChar char="•"/>
+            </a:pPr>
+            <a:r>
+              <a:rPr lang="en-US" baseline="0" dirty="0" smtClean="0"/>
+              <a:t>Document your decisions (ADR).</a:t>
+            </a:r>
+          </a:p>
+          <a:p>
+            <a:pPr marL="171450" indent="-171450">
+              <a:spcBef>
+                <a:spcPts val="0"/>
+              </a:spcBef>
+              <a:buFont typeface="Arial" charset="0"/>
+              <a:buChar char="•"/>
+            </a:pPr>
+            <a:r>
+              <a:rPr lang="en-US" baseline="0" dirty="0" smtClean="0"/>
+              <a:t>Be aware of NIH.</a:t>
+            </a:r>
+          </a:p>
+          <a:p>
+            <a:pPr marL="171450" indent="-171450">
+              <a:spcBef>
+                <a:spcPts val="0"/>
+              </a:spcBef>
+              <a:buFont typeface="Arial" charset="0"/>
+              <a:buChar char="•"/>
+            </a:pPr>
+            <a:endParaRPr lang="en-US" baseline="0" dirty="0" smtClean="0"/>
+          </a:p>
+          <a:p>
+            <a:pPr marL="0" indent="0">
+              <a:spcBef>
+                <a:spcPts val="0"/>
+              </a:spcBef>
+              <a:buFont typeface="Arial" charset="0"/>
+              <a:buNone/>
+            </a:pPr>
+            <a:r>
+              <a:rPr lang="en-US" b="1" baseline="0" dirty="0" smtClean="0"/>
+              <a:t>You build it, you run it</a:t>
+            </a:r>
+          </a:p>
+          <a:p>
+            <a:pPr marL="171450" indent="-171450">
+              <a:spcBef>
+                <a:spcPts val="0"/>
+              </a:spcBef>
+              <a:buFont typeface="Arial" charset="0"/>
+              <a:buChar char="•"/>
+            </a:pPr>
+            <a:r>
+              <a:rPr lang="en-US" baseline="0" dirty="0" smtClean="0"/>
+              <a:t>Own the product and services lifecycles includes also retiring them.</a:t>
+            </a:r>
+          </a:p>
+          <a:p>
+            <a:pPr marL="171450" indent="-171450">
+              <a:spcBef>
+                <a:spcPts val="0"/>
+              </a:spcBef>
+              <a:buFont typeface="Arial" charset="0"/>
+              <a:buChar char="•"/>
+            </a:pPr>
+            <a:endParaRPr lang="en-US" baseline="0" dirty="0" smtClean="0"/>
+          </a:p>
+          <a:p>
+            <a:pPr marL="0" indent="0">
+              <a:spcBef>
+                <a:spcPts val="0"/>
+              </a:spcBef>
+              <a:buFont typeface="Arial" charset="0"/>
+              <a:buNone/>
+            </a:pPr>
+            <a:r>
+              <a:rPr lang="en-US" b="1" baseline="0" dirty="0" smtClean="0"/>
+              <a:t>Be bold</a:t>
+            </a:r>
+          </a:p>
+          <a:p>
+            <a:pPr marL="0" indent="0">
+              <a:spcBef>
+                <a:spcPts val="0"/>
+              </a:spcBef>
+              <a:buFont typeface="Arial" charset="0"/>
+              <a:buNone/>
+            </a:pPr>
+            <a:endParaRPr lang="en-US" b="1" baseline="0" dirty="0" smtClean="0"/>
+          </a:p>
+          <a:p>
+            <a:pPr marL="171450" indent="-171450">
+              <a:spcBef>
+                <a:spcPts val="0"/>
+              </a:spcBef>
+              <a:buFont typeface="Arial" charset="0"/>
+              <a:buChar char="•"/>
+            </a:pPr>
+            <a:r>
+              <a:rPr lang="en-US" baseline="0" dirty="0" smtClean="0"/>
+              <a:t>MTBF: Mean time between failures</a:t>
+            </a:r>
+          </a:p>
+          <a:p>
+            <a:pPr marL="171450" indent="-171450">
+              <a:spcBef>
+                <a:spcPts val="0"/>
+              </a:spcBef>
+              <a:buFont typeface="Arial" charset="0"/>
+              <a:buChar char="•"/>
+            </a:pPr>
+            <a:r>
+              <a:rPr lang="en-US" baseline="0" dirty="0" smtClean="0"/>
+              <a:t>MTTR: Mean time to recovery</a:t>
+            </a:r>
+          </a:p>
+          <a:p>
+            <a:pPr marL="171450" indent="-171450">
+              <a:spcBef>
+                <a:spcPts val="0"/>
+              </a:spcBef>
+              <a:buFont typeface="Arial" charset="0"/>
+              <a:buChar char="•"/>
+            </a:pPr>
+            <a:r>
+              <a:rPr lang="en-US" baseline="0" dirty="0" smtClean="0"/>
+              <a:t>Availability </a:t>
+            </a:r>
+            <a:r>
+              <a:rPr lang="de-DE" baseline="0" dirty="0" smtClean="0"/>
+              <a:t>= MTBF / (MTBF + MTTR)</a:t>
+            </a:r>
+          </a:p>
+          <a:p>
+            <a:pPr marL="171450" indent="-171450">
+              <a:spcBef>
+                <a:spcPts val="0"/>
+              </a:spcBef>
+              <a:buFont typeface="Arial" charset="0"/>
+              <a:buChar char="•"/>
+            </a:pPr>
+            <a:endParaRPr lang="en-US" baseline="0" dirty="0" smtClean="0"/>
+          </a:p>
+          <a:p>
+            <a:pPr marL="0" indent="0">
+              <a:spcBef>
+                <a:spcPts val="0"/>
+              </a:spcBef>
+              <a:buFont typeface="Arial" charset="0"/>
+              <a:buNone/>
+            </a:pPr>
+            <a:r>
+              <a:rPr lang="en-US" b="1" baseline="0" dirty="0" smtClean="0"/>
+              <a:t>Autonomous Teams</a:t>
+            </a:r>
+          </a:p>
+          <a:p>
+            <a:pPr marL="171450" indent="-171450">
+              <a:spcBef>
+                <a:spcPts val="0"/>
+              </a:spcBef>
+              <a:buFont typeface="Arial" charset="0"/>
+              <a:buChar char="•"/>
+            </a:pPr>
+            <a:r>
+              <a:rPr lang="en-US" baseline="0" dirty="0" smtClean="0"/>
+              <a:t>Know your boundaries: Be thoughtful, when you are stepping into the realms of the macro architecture or outside your business capability.</a:t>
+            </a:r>
+          </a:p>
+          <a:p>
+            <a:pPr marL="171450" indent="-171450">
+              <a:spcBef>
+                <a:spcPts val="0"/>
+              </a:spcBef>
+              <a:buFont typeface="Arial" charset="0"/>
+              <a:buChar char="•"/>
+            </a:pPr>
+            <a:endParaRPr lang="en-US" baseline="0" dirty="0" smtClean="0"/>
+          </a:p>
+          <a:p>
+            <a:pPr marL="0" indent="0">
+              <a:spcBef>
+                <a:spcPts val="0"/>
+              </a:spcBef>
+              <a:buFont typeface="Arial" charset="0"/>
+              <a:buNone/>
+            </a:pPr>
+            <a:r>
+              <a:rPr lang="en-US" b="1" baseline="0" dirty="0" smtClean="0"/>
+              <a:t>Macro and Micro Architecture</a:t>
+            </a:r>
+          </a:p>
+          <a:p>
+            <a:pPr marL="171450" indent="-171450">
+              <a:spcBef>
+                <a:spcPts val="0"/>
+              </a:spcBef>
+              <a:buFont typeface="Arial" charset="0"/>
+              <a:buChar char="•"/>
+            </a:pPr>
+            <a:r>
+              <a:rPr lang="en-US" baseline="0" dirty="0" smtClean="0"/>
+              <a:t>For example, Scala is our default product engineering language. With good reasons you are free to deviate from that.</a:t>
+            </a:r>
+          </a:p>
+          <a:p>
+            <a:pPr marL="171450" indent="-171450">
+              <a:spcBef>
+                <a:spcPts val="0"/>
+              </a:spcBef>
+              <a:buFont typeface="Arial" charset="0"/>
+              <a:buChar char="•"/>
+            </a:pPr>
+            <a:r>
+              <a:rPr lang="en-US" baseline="0" dirty="0" smtClean="0"/>
+              <a:t>”Your freedom is not my responsibility” - Quote from a Netflix engineer: When a team makes a decision like that, it needs to able to support it in the long run.</a:t>
+            </a:r>
+          </a:p>
+          <a:p>
+            <a:pPr marL="171450" indent="-171450">
+              <a:spcBef>
+                <a:spcPts val="0"/>
+              </a:spcBef>
+              <a:buFont typeface="Arial" charset="0"/>
+              <a:buChar char="•"/>
+            </a:pPr>
+            <a:endParaRPr lang="en-US" baseline="0" dirty="0" smtClean="0"/>
+          </a:p>
+          <a:p>
+            <a:pPr marL="0" indent="0">
+              <a:spcBef>
+                <a:spcPts val="0"/>
+              </a:spcBef>
+              <a:buFont typeface="Arial" charset="0"/>
+              <a:buNone/>
+            </a:pPr>
+            <a:r>
+              <a:rPr lang="en-US" b="1" baseline="0" dirty="0" smtClean="0"/>
+              <a:t>Infrastructure as code</a:t>
+            </a:r>
+          </a:p>
+          <a:p>
+            <a:pPr marL="171450" indent="-171450">
+              <a:spcBef>
+                <a:spcPts val="0"/>
+              </a:spcBef>
+              <a:buFont typeface="Arial" charset="0"/>
+              <a:buChar char="•"/>
+            </a:pPr>
+            <a:r>
+              <a:rPr lang="en-US" b="0" baseline="0" dirty="0" smtClean="0"/>
+              <a:t>Phoenix servers and immutable containers</a:t>
+            </a:r>
+          </a:p>
+          <a:p>
+            <a:pPr marL="171450" indent="-171450">
+              <a:spcBef>
+                <a:spcPts val="0"/>
+              </a:spcBef>
+              <a:buFont typeface="Arial" charset="0"/>
+              <a:buChar char="•"/>
+            </a:pPr>
+            <a:r>
+              <a:rPr lang="en-US" b="0" baseline="0" dirty="0" smtClean="0"/>
+              <a:t>Report and alert on security and conformity violations.</a:t>
+            </a:r>
+          </a:p>
+          <a:p>
+            <a:pPr marL="171450" indent="-171450">
+              <a:spcBef>
+                <a:spcPts val="0"/>
+              </a:spcBef>
+              <a:buFont typeface="Arial" charset="0"/>
+              <a:buChar char="•"/>
+            </a:pPr>
+            <a:endParaRPr lang="en-US" baseline="0" dirty="0" smtClean="0"/>
+          </a:p>
+          <a:p>
+            <a:pPr marL="171450" indent="-171450">
+              <a:spcBef>
+                <a:spcPts val="0"/>
+              </a:spcBef>
+              <a:buFont typeface="Arial" charset="0"/>
+              <a:buChar char="•"/>
             </a:pPr>
             <a:endParaRPr lang="en-US" baseline="0" dirty="0" smtClean="0"/>
           </a:p>
@@ -3419,6 +3828,18 @@
           </a:p>
           <a:p>
             <a:r>
+              <a:rPr lang="en-US" sz="800" dirty="0" smtClean="0">
+                <a:solidFill>
+                  <a:schemeClr val="bg2"/>
+                </a:solidFill>
+                <a:latin typeface="Helvetica" pitchFamily="34" charset="0"/>
+                <a:ea typeface="Verdana" panose="020B0604030504040204" pitchFamily="34" charset="0"/>
+                <a:cs typeface="Verdana" panose="020B0604030504040204" pitchFamily="34" charset="0"/>
+                <a:sym typeface="Times New Roman"/>
+              </a:rPr>
+              <a:t>Establish fast </a:t>
+            </a:r>
+            <a:r>
               <a:rPr lang="en-US" sz="800" dirty="0">
                 <a:solidFill>
                   <a:schemeClr val="bg2"/>
@@ -3428,8 +3849,29 @@
                 <a:cs typeface="Verdana" panose="020B0604030504040204" pitchFamily="34" charset="0"/>
                 <a:sym typeface="Times New Roman"/>
               </a:rPr>
-              <a:t>Speed, Fast Feedback</a:t>
-            </a:r>
+              <a:t>feedback loops to learn, validate and improve. Remove friction, hand-offs and undifferentiated work</a:t>
+            </a:r>
+            <a:r>
+              <a:rPr lang="en-US" sz="800" dirty="0" smtClean="0">
+                <a:solidFill>
+                  <a:schemeClr val="bg2"/>
+                </a:solidFill>
+                <a:latin typeface="Helvetica" pitchFamily="34" charset="0"/>
+                <a:ea typeface="Verdana" panose="020B0604030504040204" pitchFamily="34" charset="0"/>
+                <a:cs typeface="Verdana" panose="020B0604030504040204" pitchFamily="34" charset="0"/>
+                <a:sym typeface="Times New Roman"/>
+              </a:rPr>
+              <a:t>.</a:t>
+            </a:r>
+            <a:endParaRPr lang="en-US" sz="800" dirty="0" smtClean="0">
+              <a:solidFill>
+                <a:schemeClr val="bg2"/>
+              </a:solidFill>
+              <a:latin typeface="Helvetica" pitchFamily="34" charset="0"/>
+              <a:ea typeface="Verdana" panose="020B0604030504040204" pitchFamily="34" charset="0"/>
+              <a:cs typeface="Verdana" panose="020B0604030504040204" pitchFamily="34" charset="0"/>
+              <a:sym typeface="Times New Roman"/>
+            </a:endParaRPr>
           </a:p>
         </p:txBody>
       </p:sp>
@@ -3441,7 +3883,7 @@
         </p:nvSpPr>
         <p:spPr>
           <a:xfrm>
-            <a:off x="111041" y="2090309"/>
+            <a:off x="111041" y="2085396"/>
             <a:ext cx="2828571" cy="576000"/>
           </a:xfrm>
           <a:prstGeom prst="rect">
@@ -3468,7 +3910,7 @@
                 <a:cs typeface="Verdana" panose="020B0604030504040204" pitchFamily="34" charset="0"/>
                 <a:sym typeface="Verdana"/>
               </a:rPr>
-              <a:t>COST EFFICIENCY</a:t>
+              <a:t>MOBILE FIRST</a:t>
             </a:r>
             <a:endParaRPr lang="en-US" sz="800" b="1" dirty="0">
               <a:solidFill>
@@ -3482,6 +3924,18 @@
           </a:p>
           <a:p>
             <a:r>
+              <a:rPr lang="en-US" sz="800" dirty="0" smtClean="0">
+                <a:solidFill>
+                  <a:schemeClr val="bg2"/>
+                </a:solidFill>
+                <a:latin typeface="Helvetica" pitchFamily="34" charset="0"/>
+                <a:ea typeface="Verdana" panose="020B0604030504040204" pitchFamily="34" charset="0"/>
+                <a:cs typeface="Verdana" panose="020B0604030504040204" pitchFamily="34" charset="0"/>
+                <a:sym typeface="Times New Roman"/>
+              </a:rPr>
+              <a:t>Start </a:t>
+            </a:r>
+            <a:r>
               <a:rPr lang="en-US" sz="800" dirty="0">
                 <a:solidFill>
                   <a:schemeClr val="bg2"/>
@@ -3491,7 +3945,7 @@
                 <a:cs typeface="Verdana" panose="020B0604030504040204" pitchFamily="34" charset="0"/>
                 <a:sym typeface="Times New Roman"/>
               </a:rPr>
-              <a:t>Collect metrics to allow decisions cost vs. value.</a:t>
+              <a:t>small and use device capabilities.</a:t>
             </a:r>
           </a:p>
         </p:txBody>
@@ -3504,7 +3958,7 @@
         </p:nvSpPr>
         <p:spPr>
           <a:xfrm>
-            <a:off x="111041" y="1471661"/>
+            <a:off x="111041" y="1465510"/>
             <a:ext cx="2828571" cy="576000"/>
           </a:xfrm>
           <a:prstGeom prst="rect">
@@ -3545,6 +3999,18 @@
           </a:p>
           <a:p>
             <a:r>
+              <a:rPr lang="en-US" sz="800" dirty="0" smtClean="0">
+                <a:solidFill>
+                  <a:schemeClr val="bg2"/>
+                </a:solidFill>
+                <a:latin typeface="Helvetica" pitchFamily="34" charset="0"/>
+                <a:ea typeface="Verdana" panose="020B0604030504040204" pitchFamily="34" charset="0"/>
+                <a:cs typeface="Verdana" panose="020B0604030504040204" pitchFamily="34" charset="0"/>
+                <a:sym typeface="Times New Roman"/>
+              </a:rPr>
+              <a:t>Provide relevant </a:t>
+            </a:r>
+            <a:r>
               <a:rPr lang="en-US" sz="800" dirty="0">
                 <a:solidFill>
                   <a:schemeClr val="bg2"/>
@@ -3554,10 +4020,20 @@
                 <a:cs typeface="Verdana" panose="020B0604030504040204" pitchFamily="34" charset="0"/>
                 <a:sym typeface="Times New Roman"/>
               </a:rPr>
-              <a:t>Listen to users and validate hypothesis.</a:t>
-            </a:r>
-          </a:p>
-          <a:p>
+              <a:t>metrics </a:t>
+            </a:r>
+            <a:r>
+              <a:rPr lang="en-US" sz="800" dirty="0" smtClean="0">
+                <a:solidFill>
+                  <a:schemeClr val="bg2"/>
+                </a:solidFill>
+                <a:latin typeface="Helvetica" pitchFamily="34" charset="0"/>
+                <a:ea typeface="Verdana" panose="020B0604030504040204" pitchFamily="34" charset="0"/>
+                <a:cs typeface="Verdana" panose="020B0604030504040204" pitchFamily="34" charset="0"/>
+                <a:sym typeface="Times New Roman"/>
+              </a:rPr>
+              <a:t>and data for user and market insights.</a:t>
+            </a:r>
             <a:r>
               <a:rPr lang="en-US" sz="800" dirty="0">
                 <a:solidFill>
@@ -3568,8 +4044,40 @@
                 <a:cs typeface="Verdana" panose="020B0604030504040204" pitchFamily="34" charset="0"/>
                 <a:sym typeface="Times New Roman"/>
               </a:rPr>
-              <a:t>Provide as many relevant metrics &amp; data as possible.</a:t>
-            </a:r>
+              <a:t> </a:t>
+            </a:r>
+            <a:r>
+              <a:rPr lang="en-US" sz="800" dirty="0" smtClean="0">
+                <a:solidFill>
+                  <a:schemeClr val="bg2"/>
+                </a:solidFill>
+                <a:latin typeface="Helvetica" pitchFamily="34" charset="0"/>
+                <a:ea typeface="Verdana" panose="020B0604030504040204" pitchFamily="34" charset="0"/>
+                <a:cs typeface="Verdana" panose="020B0604030504040204" pitchFamily="34" charset="0"/>
+                <a:sym typeface="Times New Roman"/>
+              </a:rPr>
+              <a:t>Validate hypothesis for problems worth solving.</a:t>
+            </a:r>
+            <a:endParaRPr lang="en-US" sz="800" dirty="0">
+              <a:solidFill>
+                <a:schemeClr val="bg2"/>
+              </a:solidFill>
+              <a:latin typeface="Helvetica" pitchFamily="34" charset="0"/>
+              <a:ea typeface="Verdana" panose="020B0604030504040204" pitchFamily="34" charset="0"/>
+              <a:cs typeface="Verdana" panose="020B0604030504040204" pitchFamily="34" charset="0"/>
+              <a:sym typeface="Times New Roman"/>
+            </a:endParaRPr>
+          </a:p>
+          <a:p>
+            <a:endParaRPr lang="en-US" sz="800" dirty="0">
+              <a:solidFill>
+                <a:schemeClr val="bg2"/>
+              </a:solidFill>
+              <a:latin typeface="Helvetica" pitchFamily="34" charset="0"/>
+              <a:ea typeface="Verdana" panose="020B0604030504040204" pitchFamily="34" charset="0"/>
+              <a:cs typeface="Verdana" panose="020B0604030504040204" pitchFamily="34" charset="0"/>
+              <a:sym typeface="Times New Roman"/>
+            </a:endParaRPr>
           </a:p>
         </p:txBody>
       </p:sp>
@@ -3581,8 +4089,8 @@
         </p:nvSpPr>
         <p:spPr>
           <a:xfrm>
-            <a:off x="6238300" y="844921"/>
-            <a:ext cx="2828571" cy="648000"/>
+            <a:off x="6237591" y="846000"/>
+            <a:ext cx="2828571" cy="576000"/>
           </a:xfrm>
           <a:prstGeom prst="rect">
             <a:avLst/>
@@ -3656,7 +4164,7 @@
         </p:nvSpPr>
         <p:spPr>
           <a:xfrm>
-            <a:off x="3175023" y="844921"/>
+            <a:off x="3174669" y="844921"/>
             <a:ext cx="2828222" cy="576000"/>
           </a:xfrm>
           <a:prstGeom prst="rect">
@@ -3706,7 +4214,7 @@
                 <a:cs typeface="Verdana" panose="020B0604030504040204" pitchFamily="34" charset="0"/>
                 <a:sym typeface="Times New Roman"/>
               </a:rPr>
-              <a:t>Build teams around products not projects. Follow the domain and respect bounded contexts. Inverse Conway </a:t>
+              <a:t>Build teams around products not projects. Follow the domain and respect bounded contexts. </a:t>
             </a:r>
             <a:r>
               <a:rPr lang="en-US" sz="800" dirty="0" smtClean="0">
@@ -3718,16 +4226,7 @@
                 <a:cs typeface="Verdana" panose="020B0604030504040204" pitchFamily="34" charset="0"/>
                 <a:sym typeface="Times New Roman"/>
               </a:rPr>
-              <a:t>Maneuver</a:t>
-            </a:r>
-            <a:r>
-              <a:rPr lang="en-US" sz="800" dirty="0" smtClean="0">
-                <a:latin typeface="Helvetica" pitchFamily="34" charset="0"/>
-                <a:ea typeface="Verdana" panose="020B0604030504040204" pitchFamily="34" charset="0"/>
-                <a:cs typeface="Verdana" panose="020B0604030504040204" pitchFamily="34" charset="0"/>
-                <a:sym typeface="Times New Roman"/>
-              </a:rPr>
-              <a:t>.</a:t>
+              <a:t>Make boundaries explicit. Inverse Conway Maneuver.</a:t>
             </a:r>
             <a:endParaRPr lang="en-US" sz="800" dirty="0">
               <a:latin typeface="Helvetica" pitchFamily="34" charset="0"/>
@@ -3746,7 +4245,7 @@
         </p:nvSpPr>
         <p:spPr>
           <a:xfrm>
-            <a:off x="3175024" y="2708530"/>
+            <a:off x="3174319" y="2041510"/>
             <a:ext cx="2828571" cy="576000"/>
           </a:xfrm>
           <a:prstGeom prst="rect">
@@ -3820,7 +4319,30 @@
                 <a:cs typeface="Verdana" panose="020B0604030504040204" pitchFamily="34" charset="0"/>
                 <a:sym typeface="Times New Roman"/>
               </a:rPr>
-              <a:t>coupling, except for the big things in common. </a:t>
+              <a:t>coupling.</a:t>
+            </a:r>
+            <a:br>
+              <a:rPr lang="en-US" sz="800" dirty="0" smtClean="0">
+                <a:solidFill>
+                  <a:schemeClr val="bg2"/>
+                </a:solidFill>
+                <a:latin typeface="Helvetica" pitchFamily="34" charset="0"/>
+                <a:ea typeface="Verdana" panose="020B0604030504040204" pitchFamily="34" charset="0"/>
+                <a:cs typeface="Verdana" panose="020B0604030504040204" pitchFamily="34" charset="0"/>
+                <a:sym typeface="Times New Roman"/>
+              </a:rPr>
+            </a:br>
+            <a:r>
+              <a:rPr lang="en-US" sz="800" dirty="0" smtClean="0">
+                <a:solidFill>
+                  <a:schemeClr val="bg2"/>
+                </a:solidFill>
+                <a:latin typeface="Helvetica" pitchFamily="34" charset="0"/>
+                <a:ea typeface="Verdana" panose="020B0604030504040204" pitchFamily="34" charset="0"/>
+                <a:cs typeface="Verdana" panose="020B0604030504040204" pitchFamily="34" charset="0"/>
+                <a:sym typeface="Times New Roman"/>
+              </a:rPr>
+              <a:t>No </a:t>
             </a:r>
             <a:r>
               <a:rPr lang="en-US" sz="800" dirty="0">
@@ -3832,8 +4354,53 @@
                 <a:cs typeface="Verdana" panose="020B0604030504040204" pitchFamily="34" charset="0"/>
                 <a:sym typeface="Times New Roman"/>
               </a:rPr>
-              <a:t>Don’t create the next monolith.</a:t>
-            </a:r>
+              <a:t>integration database. </a:t>
+            </a:r>
+            <a:r>
+              <a:rPr lang="en-US" sz="800" dirty="0" smtClean="0">
+                <a:solidFill>
+                  <a:schemeClr val="bg2"/>
+                </a:solidFill>
+                <a:latin typeface="Helvetica" pitchFamily="34" charset="0"/>
+                <a:ea typeface="Verdana" panose="020B0604030504040204" pitchFamily="34" charset="0"/>
+                <a:cs typeface="Verdana" panose="020B0604030504040204" pitchFamily="34" charset="0"/>
+                <a:sym typeface="Times New Roman"/>
+              </a:rPr>
+              <a:t>Don’t </a:t>
+            </a:r>
+            <a:r>
+              <a:rPr lang="en-US" sz="800" dirty="0">
+                <a:solidFill>
+                  <a:schemeClr val="bg2"/>
+                </a:solidFill>
+                <a:latin typeface="Helvetica" pitchFamily="34" charset="0"/>
+                <a:ea typeface="Verdana" panose="020B0604030504040204" pitchFamily="34" charset="0"/>
+                <a:cs typeface="Verdana" panose="020B0604030504040204" pitchFamily="34" charset="0"/>
+                <a:sym typeface="Times New Roman"/>
+              </a:rPr>
+              <a:t>create the next monolith</a:t>
+            </a:r>
+            <a:r>
+              <a:rPr lang="en-US" sz="800" dirty="0" smtClean="0">
+                <a:solidFill>
+                  <a:schemeClr val="bg2"/>
+                </a:solidFill>
+                <a:latin typeface="Helvetica" pitchFamily="34" charset="0"/>
+                <a:ea typeface="Verdana" panose="020B0604030504040204" pitchFamily="34" charset="0"/>
+                <a:cs typeface="Verdana" panose="020B0604030504040204" pitchFamily="34" charset="0"/>
+                <a:sym typeface="Times New Roman"/>
+              </a:rPr>
+              <a:t>.</a:t>
+            </a:r>
+            <a:endParaRPr lang="en-US" sz="800" dirty="0">
+              <a:solidFill>
+                <a:schemeClr val="bg2"/>
+              </a:solidFill>
+              <a:latin typeface="Helvetica" pitchFamily="34" charset="0"/>
+              <a:ea typeface="Verdana" panose="020B0604030504040204" pitchFamily="34" charset="0"/>
+              <a:cs typeface="Verdana" panose="020B0604030504040204" pitchFamily="34" charset="0"/>
+              <a:sym typeface="Times New Roman"/>
+            </a:endParaRPr>
           </a:p>
         </p:txBody>
       </p:sp>
@@ -3845,7 +4412,7 @@
         </p:nvSpPr>
         <p:spPr>
           <a:xfrm>
-            <a:off x="3175024" y="3329733"/>
+            <a:off x="3174318" y="2706847"/>
             <a:ext cx="2828571" cy="576000"/>
           </a:xfrm>
           <a:prstGeom prst="rect">
@@ -3895,8 +4462,29 @@
                 <a:cs typeface="Verdana" panose="020B0604030504040204" pitchFamily="34" charset="0"/>
                 <a:sym typeface="Times New Roman"/>
               </a:rPr>
-              <a:t>Clear separation. Autonomous micro services within the rules and constraints of the macro architecture.</a:t>
-            </a:r>
+              <a:t>Clear separation. Autonomous micro services within the rules and constraints of the macro architecture</a:t>
+            </a:r>
+            <a:r>
+              <a:rPr lang="en-US" sz="800" dirty="0" smtClean="0">
+                <a:solidFill>
+                  <a:schemeClr val="bg2"/>
+                </a:solidFill>
+                <a:latin typeface="Helvetica" pitchFamily="34" charset="0"/>
+                <a:ea typeface="Verdana" panose="020B0604030504040204" pitchFamily="34" charset="0"/>
+                <a:cs typeface="Verdana" panose="020B0604030504040204" pitchFamily="34" charset="0"/>
+                <a:sym typeface="Times New Roman"/>
+              </a:rPr>
+              <a:t>. </a:t>
+            </a:r>
+            <a:endParaRPr lang="en-US" sz="800" dirty="0">
+              <a:solidFill>
+                <a:schemeClr val="bg2"/>
+              </a:solidFill>
+              <a:latin typeface="Helvetica" pitchFamily="34" charset="0"/>
+              <a:ea typeface="Verdana" panose="020B0604030504040204" pitchFamily="34" charset="0"/>
+              <a:cs typeface="Verdana" panose="020B0604030504040204" pitchFamily="34" charset="0"/>
+              <a:sym typeface="Times New Roman"/>
+            </a:endParaRPr>
           </a:p>
         </p:txBody>
       </p:sp>
@@ -3908,7 +4496,7 @@
         </p:nvSpPr>
         <p:spPr>
           <a:xfrm>
-            <a:off x="3175024" y="4572141"/>
+            <a:off x="3174317" y="3944969"/>
             <a:ext cx="2828571" cy="576000"/>
           </a:xfrm>
           <a:prstGeom prst="rect">
@@ -3982,7 +4570,78 @@
                 <a:cs typeface="Verdana" panose="020B0604030504040204" pitchFamily="34" charset="0"/>
                 <a:sym typeface="Times New Roman"/>
               </a:rPr>
-              <a:t>service over managed service, over self-hosted OSS, over self-rolled solutions.</a:t>
+              <a:t>service over managed </a:t>
+            </a:r>
+            <a:r>
+              <a:rPr lang="en-US" sz="800" dirty="0" smtClean="0">
+                <a:solidFill>
+                  <a:schemeClr val="bg2"/>
+                </a:solidFill>
+                <a:latin typeface="Helvetica" pitchFamily="34" charset="0"/>
+                <a:ea typeface="Verdana" panose="020B0604030504040204" pitchFamily="34" charset="0"/>
+                <a:cs typeface="Verdana" panose="020B0604030504040204" pitchFamily="34" charset="0"/>
+                <a:sym typeface="Times New Roman"/>
+              </a:rPr>
+              <a:t>service,</a:t>
+            </a:r>
+            <a:br>
+              <a:rPr lang="en-US" sz="800" dirty="0" smtClean="0">
+                <a:solidFill>
+                  <a:schemeClr val="bg2"/>
+                </a:solidFill>
+                <a:latin typeface="Helvetica" pitchFamily="34" charset="0"/>
+                <a:ea typeface="Verdana" panose="020B0604030504040204" pitchFamily="34" charset="0"/>
+                <a:cs typeface="Verdana" panose="020B0604030504040204" pitchFamily="34" charset="0"/>
+                <a:sym typeface="Times New Roman"/>
+              </a:rPr>
+            </a:br>
+            <a:r>
+              <a:rPr lang="en-US" sz="800" dirty="0" smtClean="0">
+                <a:solidFill>
+                  <a:schemeClr val="bg2"/>
+                </a:solidFill>
+                <a:latin typeface="Helvetica" pitchFamily="34" charset="0"/>
+                <a:ea typeface="Verdana" panose="020B0604030504040204" pitchFamily="34" charset="0"/>
+                <a:cs typeface="Verdana" panose="020B0604030504040204" pitchFamily="34" charset="0"/>
+                <a:sym typeface="Times New Roman"/>
+              </a:rPr>
+              <a:t>over </a:t>
+            </a:r>
+            <a:r>
+              <a:rPr lang="en-US" sz="800" dirty="0">
+                <a:solidFill>
+                  <a:schemeClr val="bg2"/>
+                </a:solidFill>
+                <a:latin typeface="Helvetica" pitchFamily="34" charset="0"/>
+                <a:ea typeface="Verdana" panose="020B0604030504040204" pitchFamily="34" charset="0"/>
+                <a:cs typeface="Verdana" panose="020B0604030504040204" pitchFamily="34" charset="0"/>
+                <a:sym typeface="Times New Roman"/>
+              </a:rPr>
+              <a:t>self-hosted OSS, over </a:t>
+            </a:r>
+            <a:r>
+              <a:rPr lang="en-US" sz="800" dirty="0" smtClean="0">
+                <a:solidFill>
+                  <a:schemeClr val="bg2"/>
+                </a:solidFill>
+                <a:latin typeface="Helvetica" pitchFamily="34" charset="0"/>
+                <a:ea typeface="Verdana" panose="020B0604030504040204" pitchFamily="34" charset="0"/>
+                <a:cs typeface="Verdana" panose="020B0604030504040204" pitchFamily="34" charset="0"/>
+                <a:sym typeface="Times New Roman"/>
+              </a:rPr>
+              <a:t>self built solutions</a:t>
+            </a:r>
+            <a:r>
+              <a:rPr lang="en-US" sz="800" dirty="0">
+                <a:solidFill>
+                  <a:schemeClr val="bg2"/>
+                </a:solidFill>
+                <a:latin typeface="Helvetica" pitchFamily="34" charset="0"/>
+                <a:ea typeface="Verdana" panose="020B0604030504040204" pitchFamily="34" charset="0"/>
+                <a:cs typeface="Verdana" panose="020B0604030504040204" pitchFamily="34" charset="0"/>
+                <a:sym typeface="Times New Roman"/>
+              </a:rPr>
+              <a:t>.</a:t>
             </a:r>
           </a:p>
         </p:txBody>
@@ -3995,7 +4654,7 @@
         </p:nvSpPr>
         <p:spPr>
           <a:xfrm>
-            <a:off x="6238298" y="3374936"/>
+            <a:off x="6237589" y="3325168"/>
             <a:ext cx="2828571" cy="576000"/>
           </a:xfrm>
           <a:prstGeom prst="rect">
@@ -4045,7 +4704,19 @@
                 <a:cs typeface="Verdana" panose="020B0604030504040204" pitchFamily="34" charset="0"/>
                 <a:sym typeface="Times New Roman"/>
               </a:rPr>
-              <a:t>Collect metrics from processes and applications. Analyze, alert and act on them.</a:t>
+              <a:t>Collect business and operational metrics. </a:t>
+            </a:r>
+            <a:r>
+              <a:rPr lang="en-US" sz="800" dirty="0">
+                <a:solidFill>
+                  <a:schemeClr val="bg2"/>
+                </a:solidFill>
+                <a:latin typeface="Helvetica" pitchFamily="34" charset="0"/>
+                <a:ea typeface="Verdana" panose="020B0604030504040204" pitchFamily="34" charset="0"/>
+                <a:cs typeface="Verdana" panose="020B0604030504040204" pitchFamily="34" charset="0"/>
+                <a:sym typeface="Times New Roman"/>
+              </a:rPr>
+              <a:t>Analyze, alert and act on them.</a:t>
             </a:r>
           </a:p>
         </p:txBody>
@@ -4058,7 +4729,7 @@
         </p:nvSpPr>
         <p:spPr>
           <a:xfrm>
-            <a:off x="3174673" y="2087327"/>
+            <a:off x="3174320" y="1465510"/>
             <a:ext cx="2828571" cy="576000"/>
           </a:xfrm>
           <a:prstGeom prst="rect">
@@ -4108,7 +4779,7 @@
                 <a:cs typeface="Verdana" panose="020B0604030504040204" pitchFamily="34" charset="0"/>
                 <a:sym typeface="Times New Roman"/>
               </a:rPr>
-              <a:t>Strive to keep it simple. Focus on essential </a:t>
+              <a:t>Strive to keep it simple. </a:t>
             </a:r>
             <a:r>
               <a:rPr lang="en-US" sz="800" dirty="0" smtClean="0">
@@ -4120,7 +4791,30 @@
                 <a:cs typeface="Verdana" panose="020B0604030504040204" pitchFamily="34" charset="0"/>
                 <a:sym typeface="Times New Roman"/>
               </a:rPr>
-              <a:t>complexity. You build one, you delete one.</a:t>
+              <a:t>Don’t over-engineer.</a:t>
+            </a:r>
+            <a:br>
+              <a:rPr lang="en-US" sz="800" dirty="0" smtClean="0">
+                <a:solidFill>
+                  <a:schemeClr val="bg2"/>
+                </a:solidFill>
+                <a:latin typeface="Helvetica" pitchFamily="34" charset="0"/>
+                <a:ea typeface="Verdana" panose="020B0604030504040204" pitchFamily="34" charset="0"/>
+                <a:cs typeface="Verdana" panose="020B0604030504040204" pitchFamily="34" charset="0"/>
+                <a:sym typeface="Times New Roman"/>
+              </a:rPr>
+            </a:br>
+            <a:r>
+              <a:rPr lang="en-US" sz="800" dirty="0" smtClean="0">
+                <a:solidFill>
+                  <a:schemeClr val="bg2"/>
+                </a:solidFill>
+                <a:latin typeface="Helvetica" pitchFamily="34" charset="0"/>
+                <a:ea typeface="Verdana" panose="020B0604030504040204" pitchFamily="34" charset="0"/>
+                <a:cs typeface="Verdana" panose="020B0604030504040204" pitchFamily="34" charset="0"/>
+                <a:sym typeface="Times New Roman"/>
+              </a:rPr>
+              <a:t>Focus on necessary domain complexity.</a:t>
             </a:r>
             <a:endParaRPr lang="en-US" sz="800" dirty="0">
               <a:solidFill>
@@ -4142,7 +4836,7 @@
         </p:nvSpPr>
         <p:spPr>
           <a:xfrm>
-            <a:off x="6238298" y="2134406"/>
+            <a:off x="6237590" y="2041200"/>
             <a:ext cx="2828571" cy="576000"/>
           </a:xfrm>
           <a:prstGeom prst="rect">
@@ -4205,7 +4899,7 @@
         </p:nvSpPr>
         <p:spPr>
           <a:xfrm>
-            <a:off x="6238298" y="3996141"/>
+            <a:off x="6237588" y="3945600"/>
             <a:ext cx="2828571" cy="576000"/>
           </a:xfrm>
           <a:prstGeom prst="rect">
@@ -4232,7 +4926,7 @@
                 <a:cs typeface="Verdana" panose="020B0604030504040204" pitchFamily="34" charset="0"/>
                 <a:sym typeface="Verdana"/>
               </a:rPr>
-              <a:t>INFRASTRACTURE AS CODE</a:t>
+              <a:t>INFRASTRUCTURE AS CODE</a:t>
             </a:r>
             <a:endParaRPr lang="en-US" sz="800" b="1" dirty="0">
               <a:solidFill>
@@ -4256,11 +4950,20 @@
                 <a:cs typeface="Verdana" panose="020B0604030504040204" pitchFamily="34" charset="0"/>
                 <a:sym typeface="Times New Roman"/>
               </a:rPr>
-              <a:t>Automate everything: Reproducible, traceable and tested.</a:t>
-            </a:r>
-          </a:p>
-          <a:p>
-            <a:pPr lvl="0"/>
+              <a:t>Automate everything: Reproducible, </a:t>
+            </a:r>
+            <a:r>
+              <a:rPr lang="en-US" sz="800" dirty="0" smtClean="0">
+                <a:solidFill>
+                  <a:schemeClr val="bg2"/>
+                </a:solidFill>
+                <a:latin typeface="Helvetica" pitchFamily="34" charset="0"/>
+                <a:ea typeface="Verdana" panose="020B0604030504040204" pitchFamily="34" charset="0"/>
+                <a:cs typeface="Verdana" panose="020B0604030504040204" pitchFamily="34" charset="0"/>
+                <a:sym typeface="Times New Roman"/>
+              </a:rPr>
+              <a:t>traceable, auditable </a:t>
+            </a:r>
             <a:r>
               <a:rPr lang="en-US" sz="800" dirty="0">
                 <a:solidFill>
@@ -4271,8 +4974,29 @@
                 <a:cs typeface="Verdana" panose="020B0604030504040204" pitchFamily="34" charset="0"/>
                 <a:sym typeface="Times New Roman"/>
               </a:rPr>
-              <a:t>Immutable servers over snowflake servers.</a:t>
-            </a:r>
+              <a:t>and </a:t>
+            </a:r>
+            <a:r>
+              <a:rPr lang="en-US" sz="800" dirty="0" smtClean="0">
+                <a:solidFill>
+                  <a:schemeClr val="bg2"/>
+                </a:solidFill>
+                <a:latin typeface="Helvetica" pitchFamily="34" charset="0"/>
+                <a:ea typeface="Verdana" panose="020B0604030504040204" pitchFamily="34" charset="0"/>
+                <a:cs typeface="Verdana" panose="020B0604030504040204" pitchFamily="34" charset="0"/>
+                <a:sym typeface="Times New Roman"/>
+              </a:rPr>
+              <a:t>tested. Immutable servers.</a:t>
+            </a:r>
+            <a:endParaRPr lang="en-US" sz="800" dirty="0">
+              <a:solidFill>
+                <a:schemeClr val="bg2"/>
+              </a:solidFill>
+              <a:latin typeface="Helvetica" pitchFamily="34" charset="0"/>
+              <a:ea typeface="Verdana" panose="020B0604030504040204" pitchFamily="34" charset="0"/>
+              <a:cs typeface="Verdana" panose="020B0604030504040204" pitchFamily="34" charset="0"/>
+              <a:sym typeface="Times New Roman"/>
+            </a:endParaRPr>
           </a:p>
         </p:txBody>
       </p:sp>
@@ -4284,106 +5008,7 @@
         </p:nvSpPr>
         <p:spPr>
           <a:xfrm>
-            <a:off x="6238300" y="1542164"/>
-            <a:ext cx="2828571" cy="542999"/>
-          </a:xfrm>
-          <a:prstGeom prst="rect">
-            <a:avLst/>
-          </a:prstGeom>
-          <a:noFill/>
-          <a:ln>
-            <a:noFill/>
-          </a:ln>
-        </p:spPr>
-        <p:txBody>
-          <a:bodyPr lIns="91409" tIns="91409" rIns="91409" bIns="91409" anchor="t" anchorCtr="0">
-            <a:noAutofit/>
-          </a:bodyPr>
-          <a:lstStyle/>
-          <a:p>
-            <a:r>
-              <a:rPr lang="en-US" sz="800" b="1" dirty="0" smtClean="0">
-                <a:solidFill>
-                  <a:srgbClr val="3D648C"/>
-                </a:solidFill>
-                <a:latin typeface="Helvetica" pitchFamily="34" charset="0"/>
-                <a:ea typeface="Verdana" panose="020B0604030504040204" pitchFamily="34" charset="0"/>
-                <a:cs typeface="Verdana" panose="020B0604030504040204" pitchFamily="34" charset="0"/>
-                <a:sym typeface="Verdana"/>
-              </a:rPr>
-              <a:t>COLLABORATION CULTURE</a:t>
-            </a:r>
-            <a:endParaRPr lang="en-US" sz="800" b="1" dirty="0">
-              <a:solidFill>
-                <a:srgbClr val="3D648C"/>
-              </a:solidFill>
-              <a:latin typeface="Helvetica" pitchFamily="34" charset="0"/>
-              <a:ea typeface="Verdana" panose="020B0604030504040204" pitchFamily="34" charset="0"/>
-              <a:cs typeface="Verdana" panose="020B0604030504040204" pitchFamily="34" charset="0"/>
-              <a:sym typeface="Verdana"/>
-            </a:endParaRPr>
-          </a:p>
-          <a:p>
-            <a:r>
-              <a:rPr lang="en-US" sz="800" dirty="0" smtClean="0">
-                <a:solidFill>
-                  <a:schemeClr val="bg2"/>
-                </a:solidFill>
-                <a:latin typeface="Helvetica" pitchFamily="34" charset="0"/>
-                <a:ea typeface="Verdana" panose="020B0604030504040204" pitchFamily="34" charset="0"/>
-                <a:cs typeface="Verdana" panose="020B0604030504040204" pitchFamily="34" charset="0"/>
-                <a:sym typeface="Times New Roman"/>
-              </a:rPr>
-              <a:t>Engineers from all backgrounds </a:t>
-            </a:r>
-            <a:r>
-              <a:rPr lang="en-US" sz="800" dirty="0">
-                <a:solidFill>
-                  <a:schemeClr val="bg2"/>
-                </a:solidFill>
-                <a:latin typeface="Helvetica" pitchFamily="34" charset="0"/>
-                <a:ea typeface="Verdana" panose="020B0604030504040204" pitchFamily="34" charset="0"/>
-                <a:cs typeface="Verdana" panose="020B0604030504040204" pitchFamily="34" charset="0"/>
-                <a:sym typeface="Times New Roman"/>
-              </a:rPr>
-              <a:t>work together in collaborative teams as </a:t>
-            </a:r>
-            <a:r>
-              <a:rPr lang="en-US" sz="800" dirty="0" smtClean="0">
-                <a:solidFill>
-                  <a:schemeClr val="bg2"/>
-                </a:solidFill>
-                <a:latin typeface="Helvetica" pitchFamily="34" charset="0"/>
-                <a:ea typeface="Verdana" panose="020B0604030504040204" pitchFamily="34" charset="0"/>
-                <a:cs typeface="Verdana" panose="020B0604030504040204" pitchFamily="34" charset="0"/>
-                <a:sym typeface="Times New Roman"/>
-              </a:rPr>
-              <a:t>engineers and share responsibilities. </a:t>
-            </a:r>
-            <a:r>
-              <a:rPr lang="en-US" sz="800" dirty="0">
-                <a:solidFill>
-                  <a:schemeClr val="bg2"/>
-                </a:solidFill>
-                <a:latin typeface="Helvetica" pitchFamily="34" charset="0"/>
-                <a:ea typeface="Verdana" panose="020B0604030504040204" pitchFamily="34" charset="0"/>
-                <a:cs typeface="Verdana" panose="020B0604030504040204" pitchFamily="34" charset="0"/>
-                <a:sym typeface="Times New Roman"/>
-              </a:rPr>
-              <a:t>No silos.</a:t>
-            </a:r>
-          </a:p>
-        </p:txBody>
-      </p:sp>
-      <p:sp>
-        <p:nvSpPr>
-          <p:cNvPr id="48" name="Shape 48"/>
-          <p:cNvSpPr txBox="1"/>
-          <p:nvPr/>
-        </p:nvSpPr>
-        <p:spPr>
-          <a:xfrm>
-            <a:off x="6238298" y="2753733"/>
+            <a:off x="6237591" y="1466828"/>
             <a:ext cx="2828571" cy="576000"/>
           </a:xfrm>
           <a:prstGeom prst="rect">
@@ -4410,7 +5035,7 @@
                 <a:cs typeface="Verdana" panose="020B0604030504040204" pitchFamily="34" charset="0"/>
                 <a:sym typeface="Verdana"/>
               </a:rPr>
-              <a:t>BE BOLD</a:t>
+              <a:t>CROSS-FUNCTIONAL TEAMS</a:t>
             </a:r>
             <a:endParaRPr lang="en-US" sz="800" b="1" dirty="0">
               <a:solidFill>
@@ -4423,7 +5048,18 @@
             </a:endParaRPr>
           </a:p>
           <a:p>
-            <a:pPr lvl="0"/>
+            <a:r>
+              <a:rPr lang="en-US" sz="800" dirty="0" smtClean="0">
+                <a:solidFill>
+                  <a:schemeClr val="bg2"/>
+                </a:solidFill>
+                <a:latin typeface="Helvetica" pitchFamily="34" charset="0"/>
+                <a:ea typeface="Verdana" panose="020B0604030504040204" pitchFamily="34" charset="0"/>
+                <a:cs typeface="Verdana" panose="020B0604030504040204" pitchFamily="34" charset="0"/>
+                <a:sym typeface="Times New Roman"/>
+              </a:rPr>
+              <a:t>Engineers from all backgrounds </a:t>
+            </a:r>
             <a:r>
               <a:rPr lang="en-US" sz="800" dirty="0">
                 <a:solidFill>
@@ -4434,7 +5070,7 @@
                 <a:cs typeface="Verdana" panose="020B0604030504040204" pitchFamily="34" charset="0"/>
                 <a:sym typeface="Times New Roman"/>
               </a:rPr>
-              <a:t>Go into production early. Value monitoring over tests. Recover and learn. Optimize for MTTR not </a:t>
+              <a:t>work together in collaborative teams as </a:t>
             </a:r>
             <a:r>
               <a:rPr lang="en-US" sz="800" dirty="0" smtClean="0">
@@ -4446,7 +5082,7 @@
                 <a:cs typeface="Verdana" panose="020B0604030504040204" pitchFamily="34" charset="0"/>
                 <a:sym typeface="Times New Roman"/>
               </a:rPr>
-              <a:t>MTBF</a:t>
+              <a:t>engineers and share responsibilities. </a:t>
             </a:r>
             <a:r>
               <a:rPr lang="en-US" sz="800" dirty="0">
@@ -4458,20 +5094,20 @@
                 <a:cs typeface="Verdana" panose="020B0604030504040204" pitchFamily="34" charset="0"/>
                 <a:sym typeface="Times New Roman"/>
               </a:rPr>
-              <a:t>.</a:t>
+              <a:t>No silos.</a:t>
             </a:r>
           </a:p>
         </p:txBody>
       </p:sp>
       <p:sp>
         <p:nvSpPr>
-          <p:cNvPr id="22" name="Shape 40"/>
+          <p:cNvPr id="48" name="Shape 48"/>
           <p:cNvSpPr txBox="1"/>
           <p:nvPr/>
         </p:nvSpPr>
         <p:spPr>
           <a:xfrm>
-            <a:off x="3175023" y="3950936"/>
+            <a:off x="6238298" y="2707200"/>
             <a:ext cx="2828571" cy="576000"/>
           </a:xfrm>
           <a:prstGeom prst="rect">
@@ -4498,7 +5134,7 @@
                 <a:cs typeface="Verdana" panose="020B0604030504040204" pitchFamily="34" charset="0"/>
                 <a:sym typeface="Verdana"/>
               </a:rPr>
-              <a:t>SECURITY, COMPLIANCE AND DATA PRIVACY</a:t>
+              <a:t>BE BOLD</a:t>
             </a:r>
             <a:endParaRPr lang="en-US" sz="800" b="1" dirty="0">
               <a:solidFill>
@@ -4522,7 +5158,7 @@
                 <a:cs typeface="Verdana" panose="020B0604030504040204" pitchFamily="34" charset="0"/>
                 <a:sym typeface="Times New Roman"/>
               </a:rPr>
-              <a:t>Security must be </a:t>
+              <a:t>Go into production early. Value monitoring over </a:t>
             </a:r>
             <a:r>
               <a:rPr lang="en-US" sz="800" dirty="0" smtClean="0">
@@ -4534,7 +5170,30 @@
                 <a:cs typeface="Verdana" panose="020B0604030504040204" pitchFamily="34" charset="0"/>
                 <a:sym typeface="Times New Roman"/>
               </a:rPr>
-              <a:t>included from the beginning </a:t>
+              <a:t>tests.</a:t>
+            </a:r>
+            <a:br>
+              <a:rPr lang="en-US" sz="800" dirty="0" smtClean="0">
+                <a:solidFill>
+                  <a:schemeClr val="bg2"/>
+                </a:solidFill>
+                <a:latin typeface="Helvetica" pitchFamily="34" charset="0"/>
+                <a:ea typeface="Verdana" panose="020B0604030504040204" pitchFamily="34" charset="0"/>
+                <a:cs typeface="Verdana" panose="020B0604030504040204" pitchFamily="34" charset="0"/>
+                <a:sym typeface="Times New Roman"/>
+              </a:rPr>
+            </a:br>
+            <a:r>
+              <a:rPr lang="en-US" sz="800" dirty="0" smtClean="0">
+                <a:solidFill>
+                  <a:schemeClr val="bg2"/>
+                </a:solidFill>
+                <a:latin typeface="Helvetica" pitchFamily="34" charset="0"/>
+                <a:ea typeface="Verdana" panose="020B0604030504040204" pitchFamily="34" charset="0"/>
+                <a:cs typeface="Verdana" panose="020B0604030504040204" pitchFamily="34" charset="0"/>
+                <a:sym typeface="Times New Roman"/>
+              </a:rPr>
+              <a:t>Fail fast, recover </a:t>
             </a:r>
             <a:r>
               <a:rPr lang="en-US" sz="800" dirty="0">
@@ -4546,20 +5205,44 @@
                 <a:cs typeface="Verdana" panose="020B0604030504040204" pitchFamily="34" charset="0"/>
                 <a:sym typeface="Times New Roman"/>
               </a:rPr>
-              <a:t>and everybody’s concern. Keep data-privacy in mind.</a:t>
+              <a:t>and learn. Optimize for MTTR not </a:t>
+            </a:r>
+            <a:r>
+              <a:rPr lang="en-US" sz="800" dirty="0" smtClean="0">
+                <a:solidFill>
+                  <a:schemeClr val="bg2"/>
+                </a:solidFill>
+                <a:latin typeface="Helvetica" pitchFamily="34" charset="0"/>
+                <a:ea typeface="Verdana" panose="020B0604030504040204" pitchFamily="34" charset="0"/>
+                <a:cs typeface="Verdana" panose="020B0604030504040204" pitchFamily="34" charset="0"/>
+                <a:sym typeface="Times New Roman"/>
+              </a:rPr>
+              <a:t>MTBF</a:t>
+            </a:r>
+            <a:r>
+              <a:rPr lang="en-US" sz="800" dirty="0">
+                <a:solidFill>
+                  <a:schemeClr val="bg2"/>
+                </a:solidFill>
+                <a:latin typeface="Helvetica" pitchFamily="34" charset="0"/>
+                <a:ea typeface="Verdana" panose="020B0604030504040204" pitchFamily="34" charset="0"/>
+                <a:cs typeface="Verdana" panose="020B0604030504040204" pitchFamily="34" charset="0"/>
+                <a:sym typeface="Times New Roman"/>
+              </a:rPr>
+              <a:t>.</a:t>
             </a:r>
           </a:p>
         </p:txBody>
       </p:sp>
       <p:sp>
         <p:nvSpPr>
-          <p:cNvPr id="23" name="Shape 34"/>
+          <p:cNvPr id="22" name="Shape 40"/>
           <p:cNvSpPr txBox="1"/>
           <p:nvPr/>
         </p:nvSpPr>
         <p:spPr>
           <a:xfrm>
-            <a:off x="111040" y="2714836"/>
+            <a:off x="3174318" y="3325168"/>
             <a:ext cx="2828571" cy="576000"/>
           </a:xfrm>
           <a:prstGeom prst="rect">
@@ -4586,7 +5269,7 @@
                 <a:cs typeface="Verdana" panose="020B0604030504040204" pitchFamily="34" charset="0"/>
                 <a:sym typeface="Verdana"/>
               </a:rPr>
-              <a:t>ONE SCOUT IT</a:t>
+              <a:t>SECURITY, COMPLIANCE AND DATA PRIVACY</a:t>
             </a:r>
             <a:endParaRPr lang="en-US" sz="800" b="1" dirty="0">
               <a:solidFill>
@@ -4599,6 +5282,7 @@
             </a:endParaRPr>
           </a:p>
           <a:p>
+            <a:pPr lvl="0"/>
             <a:r>
               <a:rPr lang="en-US" sz="800" dirty="0" smtClean="0">
                 <a:solidFill>
@@ -4609,7 +5293,30 @@
                 <a:cs typeface="Verdana" panose="020B0604030504040204" pitchFamily="34" charset="0"/>
                 <a:sym typeface="Times New Roman"/>
               </a:rPr>
-              <a:t>Big things should be common. </a:t>
+              <a:t>Build with least privilege and data privacy in mind.</a:t>
+            </a:r>
+            <a:br>
+              <a:rPr lang="en-US" sz="800" dirty="0" smtClean="0">
+                <a:solidFill>
+                  <a:schemeClr val="bg2"/>
+                </a:solidFill>
+                <a:latin typeface="Helvetica" pitchFamily="34" charset="0"/>
+                <a:ea typeface="Verdana" panose="020B0604030504040204" pitchFamily="34" charset="0"/>
+                <a:cs typeface="Verdana" panose="020B0604030504040204" pitchFamily="34" charset="0"/>
+                <a:sym typeface="Times New Roman"/>
+              </a:rPr>
+            </a:br>
+            <a:r>
+              <a:rPr lang="en-US" sz="800" dirty="0" smtClean="0">
+                <a:solidFill>
+                  <a:schemeClr val="bg2"/>
+                </a:solidFill>
+                <a:latin typeface="Helvetica" pitchFamily="34" charset="0"/>
+                <a:ea typeface="Verdana" panose="020B0604030504040204" pitchFamily="34" charset="0"/>
+                <a:cs typeface="Verdana" panose="020B0604030504040204" pitchFamily="34" charset="0"/>
+                <a:sym typeface="Times New Roman"/>
+              </a:rPr>
+              <a:t>Know your threat model. Limit blast radius.</a:t>
             </a:r>
             <a:endParaRPr lang="en-US" sz="800" dirty="0">
               <a:solidFill>
@@ -4625,13 +5332,13 @@
       </p:sp>
       <p:sp>
         <p:nvSpPr>
-          <p:cNvPr id="24" name="Shape 42"/>
+          <p:cNvPr id="23" name="Shape 34"/>
           <p:cNvSpPr txBox="1"/>
           <p:nvPr/>
         </p:nvSpPr>
         <p:spPr>
           <a:xfrm>
-            <a:off x="3174673" y="1466124"/>
+            <a:off x="111035" y="3325168"/>
             <a:ext cx="2828571" cy="576000"/>
           </a:xfrm>
           <a:prstGeom prst="rect">
@@ -4649,7 +5356,7 @@
           <a:lstStyle/>
           <a:p>
             <a:r>
-              <a:rPr lang="en-US" sz="800" b="1" dirty="0" smtClean="0">
+              <a:rPr lang="en-US" sz="800" b="1" dirty="0">
                 <a:solidFill>
                   <a:srgbClr val="3D648C"/>
                 </a:solidFill>
@@ -4658,7 +5365,7 @@
                 <a:cs typeface="Verdana" panose="020B0604030504040204" pitchFamily="34" charset="0"/>
                 <a:sym typeface="Verdana"/>
               </a:rPr>
-              <a:t>CONTAINMENT AND BOUNDARIES</a:t>
+              <a:t>COST EFFICIENCY</a:t>
             </a:r>
           </a:p>
           <a:p>
@@ -4670,37 +5377,14 @@
                 <a:latin typeface="Helvetica" pitchFamily="34" charset="0"/>
                 <a:ea typeface="Verdana" panose="020B0604030504040204" pitchFamily="34" charset="0"/>
                 <a:cs typeface="Verdana" panose="020B0604030504040204" pitchFamily="34" charset="0"/>
-                <a:sym typeface="Verdana"/>
-              </a:rPr>
-              <a:t>Align blast radius and vendor lock-in with the boundaries of the organization</a:t>
-            </a:r>
-            <a:r>
-              <a:rPr lang="en-US" sz="800" dirty="0">
-                <a:solidFill>
-                  <a:schemeClr val="bg2"/>
-                </a:solidFill>
-                <a:latin typeface="Helvetica" pitchFamily="34" charset="0"/>
-                <a:ea typeface="Verdana" panose="020B0604030504040204" pitchFamily="34" charset="0"/>
-                <a:cs typeface="Verdana" panose="020B0604030504040204" pitchFamily="34" charset="0"/>
-                <a:sym typeface="Verdana"/>
-              </a:rPr>
-              <a:t> </a:t>
-            </a:r>
-            <a:r>
-              <a:rPr lang="en-US" sz="800" dirty="0" smtClean="0">
-                <a:solidFill>
-                  <a:schemeClr val="bg2"/>
-                </a:solidFill>
-                <a:latin typeface="Helvetica" pitchFamily="34" charset="0"/>
-                <a:ea typeface="Verdana" panose="020B0604030504040204" pitchFamily="34" charset="0"/>
-                <a:cs typeface="Verdana" panose="020B0604030504040204" pitchFamily="34" charset="0"/>
-                <a:sym typeface="Verdana"/>
-              </a:rPr>
-              <a:t>or business capabilities.</a:t>
-            </a:r>
-          </a:p>
-          <a:p>
+                <a:sym typeface="Times New Roman"/>
+              </a:rPr>
+              <a:t>Run your segment in the right balance of cost and value.</a:t>
+            </a:r>
             <a:endParaRPr lang="en-US" sz="800" dirty="0">
+              <a:solidFill>
+                <a:schemeClr val="bg2"/>
+              </a:solidFill>
               <a:latin typeface="Helvetica" pitchFamily="34" charset="0"/>
               <a:ea typeface="Verdana" panose="020B0604030504040204" pitchFamily="34" charset="0"/>
               <a:cs typeface="Verdana" panose="020B0604030504040204" pitchFamily="34" charset="0"/>
@@ -4781,7 +5465,7 @@
         </p:nvSpPr>
         <p:spPr>
           <a:xfrm>
-            <a:off x="111046" y="3364213"/>
+            <a:off x="111041" y="3945053"/>
             <a:ext cx="2828571" cy="576000"/>
           </a:xfrm>
           <a:prstGeom prst="rect">
@@ -4799,6 +5483,18 @@
           <a:lstStyle/>
           <a:p>
             <a:r>
+              <a:rPr lang="en-US" sz="800" b="1" dirty="0">
+                <a:solidFill>
+                  <a:srgbClr val="3D648C"/>
+                </a:solidFill>
+                <a:latin typeface="Helvetica" pitchFamily="34" charset="0"/>
+                <a:ea typeface="Verdana" panose="020B0604030504040204" pitchFamily="34" charset="0"/>
+                <a:cs typeface="Verdana" panose="020B0604030504040204" pitchFamily="34" charset="0"/>
+                <a:sym typeface="Verdana"/>
+              </a:rPr>
+              <a:t>ONE SCOUT </a:t>
+            </a:r>
+            <a:r>
               <a:rPr lang="en-US" sz="800" b="1" dirty="0" smtClean="0">
                 <a:solidFill>
                   <a:srgbClr val="3D648C"/>
@@ -4808,17 +5504,8 @@
                 <a:cs typeface="Verdana" panose="020B0604030504040204" pitchFamily="34" charset="0"/>
                 <a:sym typeface="Verdana"/>
               </a:rPr>
-              <a:t>OPTIMIZE FOR GROWTH</a:t>
-            </a:r>
-            <a:endParaRPr lang="en-US" sz="800" b="1" dirty="0">
-              <a:solidFill>
-                <a:srgbClr val="3D648C"/>
-              </a:solidFill>
-              <a:latin typeface="Helvetica" pitchFamily="34" charset="0"/>
-              <a:ea typeface="Verdana" panose="020B0604030504040204" pitchFamily="34" charset="0"/>
-              <a:cs typeface="Verdana" panose="020B0604030504040204" pitchFamily="34" charset="0"/>
-              <a:sym typeface="Verdana"/>
-            </a:endParaRPr>
+              <a:t>IT</a:t>
+            </a:r>
           </a:p>
           <a:p>
             <a:r>
@@ -4831,10 +5518,12 @@
                 <a:cs typeface="Verdana" panose="020B0604030504040204" pitchFamily="34" charset="0"/>
                 <a:sym typeface="Times New Roman"/>
               </a:rPr>
-              <a:t>Don’t optimize for forced exit</a:t>
-            </a:r>
-            <a:r>
-              <a:rPr lang="en-US" sz="800" dirty="0">
+              <a:t>Foster collaboration. Harmonize and standardize tools.</a:t>
+            </a:r>
+          </a:p>
+          <a:p>
+            <a:r>
+              <a:rPr lang="en-US" sz="800" dirty="0" smtClean="0">
                 <a:solidFill>
                   <a:schemeClr val="bg2"/>
                 </a:solidFill>
@@ -4843,19 +5532,7 @@
                 <a:cs typeface="Verdana" panose="020B0604030504040204" pitchFamily="34" charset="0"/>
                 <a:sym typeface="Times New Roman"/>
               </a:rPr>
-              <a:t> </a:t>
-            </a:r>
-            <a:r>
-              <a:rPr lang="en-US" sz="800" dirty="0" smtClean="0">
-                <a:solidFill>
-                  <a:schemeClr val="bg2"/>
-                </a:solidFill>
-                <a:latin typeface="Helvetica" pitchFamily="34" charset="0"/>
-                <a:ea typeface="Verdana" panose="020B0604030504040204" pitchFamily="34" charset="0"/>
-                <a:cs typeface="Verdana" panose="020B0604030504040204" pitchFamily="34" charset="0"/>
-                <a:sym typeface="Times New Roman"/>
-              </a:rPr>
-              <a:t>but for voluntary exit at our speed.</a:t>
+              <a:t>Pull common capabilities into decoupled platform services.</a:t>
             </a:r>
             <a:endParaRPr lang="en-US" sz="800" dirty="0">
               <a:solidFill>
@@ -5066,7 +5743,7 @@
                   <a:schemeClr val="bg2"/>
                 </a:solidFill>
               </a:rPr>
-              <a:t>Version 1.0</a:t>
+              <a:t>Version 2.0</a:t>
             </a:r>
           </a:p>
           <a:p>
@@ -5291,6 +5968,78 @@
           <a:p>
             <a:pPr algn="ctr"/>
             <a:endParaRPr lang="de-DE"/>
+          </a:p>
+        </p:txBody>
+      </p:sp>
+      <p:sp>
+        <p:nvSpPr>
+          <p:cNvPr id="29" name="Shape 34"/>
+          <p:cNvSpPr txBox="1"/>
+          <p:nvPr/>
+        </p:nvSpPr>
+        <p:spPr>
+          <a:xfrm>
+            <a:off x="111034" y="2705282"/>
+            <a:ext cx="2828571" cy="576000"/>
+          </a:xfrm>
+          <a:prstGeom prst="rect">
+            <a:avLst/>
+          </a:prstGeom>
+          <a:noFill/>
+          <a:ln>
+            <a:noFill/>
+          </a:ln>
+        </p:spPr>
+        <p:txBody>
+          <a:bodyPr lIns="91409" tIns="91409" rIns="91409" bIns="91409" anchor="t" anchorCtr="0">
+            <a:noAutofit/>
+          </a:bodyPr>
+          <a:lstStyle/>
+          <a:p>
+            <a:r>
+              <a:rPr lang="en-US" sz="800" b="1" dirty="0" smtClean="0">
+                <a:solidFill>
+                  <a:srgbClr val="3D648C"/>
+                </a:solidFill>
+                <a:latin typeface="Helvetica" pitchFamily="34" charset="0"/>
+                <a:ea typeface="Verdana" panose="020B0604030504040204" pitchFamily="34" charset="0"/>
+                <a:cs typeface="Verdana" panose="020B0604030504040204" pitchFamily="34" charset="0"/>
+                <a:sym typeface="Verdana"/>
+              </a:rPr>
+              <a:t>BEST TALENT</a:t>
+            </a:r>
+            <a:endParaRPr lang="en-US" sz="800" b="1" dirty="0">
+              <a:solidFill>
+                <a:srgbClr val="3D648C"/>
+              </a:solidFill>
+              <a:latin typeface="Helvetica" pitchFamily="34" charset="0"/>
+              <a:ea typeface="Verdana" panose="020B0604030504040204" pitchFamily="34" charset="0"/>
+              <a:cs typeface="Verdana" panose="020B0604030504040204" pitchFamily="34" charset="0"/>
+              <a:sym typeface="Verdana"/>
+            </a:endParaRPr>
+          </a:p>
+          <a:p>
+            <a:r>
+              <a:rPr lang="en-US" sz="800" dirty="0" smtClean="0">
+                <a:solidFill>
+                  <a:schemeClr val="bg2"/>
+                </a:solidFill>
+                <a:latin typeface="Helvetica" pitchFamily="34" charset="0"/>
+                <a:ea typeface="Verdana" panose="020B0604030504040204" pitchFamily="34" charset="0"/>
+                <a:cs typeface="Verdana" panose="020B0604030504040204" pitchFamily="34" charset="0"/>
+                <a:sym typeface="Times New Roman"/>
+              </a:rPr>
+              <a:t>Autonomy, Purpose and Mastery: We know why we do things, we decide how to approach them and deliberately practice our skills.</a:t>
+            </a:r>
+            <a:endParaRPr lang="en-US" sz="800" dirty="0">
+              <a:solidFill>
+                <a:schemeClr val="bg2"/>
+              </a:solidFill>
+              <a:latin typeface="Helvetica" pitchFamily="34" charset="0"/>
+              <a:ea typeface="Verdana" panose="020B0604030504040204" pitchFamily="34" charset="0"/>
+              <a:cs typeface="Verdana" panose="020B0604030504040204" pitchFamily="34" charset="0"/>
+              <a:sym typeface="Times New Roman"/>
+            </a:endParaRPr>
           </a:p>
         </p:txBody>
       </p:sp>

</xml_diff>